<commit_message>
Update to coverage presentation
</commit_message>
<xml_diff>
--- a/Presentations/OGC API Coverage 20190620.pptx
+++ b/Presentations/OGC API Coverage 20190620.pptx
@@ -561,10 +561,10 @@
           </a:ln>
           <a:extLst>
             <a:ext uri="{FAA26D3D-D897-4be2-8F04-BA451C77F1D7}">
-              <ma14:placeholderFlag xmlns="" xmlns:ma14="http://schemas.microsoft.com/office/mac/drawingml/2011/main" val="1"/>
+              <ma14:placeholderFlag xmlns:ma14="http://schemas.microsoft.com/office/mac/drawingml/2011/main" xmlns="" val="1"/>
             </a:ext>
             <a:ext uri="{909E8E84-426E-40dd-AFC4-6F175D3DCCD1}">
-              <a14:hiddenFill xmlns:a14="http://schemas.microsoft.com/office/drawing/2010/main" xmlns="">
+              <a14:hiddenFill xmlns="" xmlns:a14="http://schemas.microsoft.com/office/drawing/2010/main">
                 <a:solidFill>
                   <a:srgbClr val="FFFFFF"/>
                 </a:solidFill>
@@ -1082,14 +1082,14 @@
           </a:ln>
           <a:extLst>
             <a:ext uri="{909E8E84-426E-40dd-AFC4-6F175D3DCCD1}">
-              <a14:hiddenFill xmlns:a14="http://schemas.microsoft.com/office/drawing/2010/main" xmlns="">
+              <a14:hiddenFill xmlns="" xmlns:a14="http://schemas.microsoft.com/office/drawing/2010/main">
                 <a:solidFill>
                   <a:srgbClr val="FFFFFF"/>
                 </a:solidFill>
               </a14:hiddenFill>
             </a:ext>
             <a:ext uri="{91240B29-F687-4f45-9708-019B960494DF}">
-              <a14:hiddenLine xmlns:a14="http://schemas.microsoft.com/office/drawing/2010/main" xmlns="" w="9525">
+              <a14:hiddenLine xmlns="" xmlns:a14="http://schemas.microsoft.com/office/drawing/2010/main" w="9525">
                 <a:solidFill>
                   <a:srgbClr val="000000"/>
                 </a:solidFill>
@@ -1136,14 +1136,14 @@
           </a:ln>
           <a:extLst>
             <a:ext uri="{909E8E84-426E-40dd-AFC4-6F175D3DCCD1}">
-              <a14:hiddenFill xmlns:a14="http://schemas.microsoft.com/office/drawing/2010/main" xmlns="">
+              <a14:hiddenFill xmlns="" xmlns:a14="http://schemas.microsoft.com/office/drawing/2010/main">
                 <a:solidFill>
                   <a:srgbClr val="FFFFFF"/>
                 </a:solidFill>
               </a14:hiddenFill>
             </a:ext>
             <a:ext uri="{91240B29-F687-4f45-9708-019B960494DF}">
-              <a14:hiddenLine xmlns:a14="http://schemas.microsoft.com/office/drawing/2010/main" xmlns="" w="9525">
+              <a14:hiddenLine xmlns="" xmlns:a14="http://schemas.microsoft.com/office/drawing/2010/main" w="9525">
                 <a:solidFill>
                   <a:srgbClr val="000000"/>
                 </a:solidFill>
@@ -3538,14 +3538,14 @@
           </a:ln>
           <a:extLst>
             <a:ext uri="{909E8E84-426E-40dd-AFC4-6F175D3DCCD1}">
-              <a14:hiddenFill xmlns:a14="http://schemas.microsoft.com/office/drawing/2010/main" xmlns="">
+              <a14:hiddenFill xmlns="" xmlns:a14="http://schemas.microsoft.com/office/drawing/2010/main">
                 <a:solidFill>
                   <a:srgbClr val="FFFFFF"/>
                 </a:solidFill>
               </a14:hiddenFill>
             </a:ext>
             <a:ext uri="{91240B29-F687-4f45-9708-019B960494DF}">
-              <a14:hiddenLine xmlns:a14="http://schemas.microsoft.com/office/drawing/2010/main" xmlns="" w="9525">
+              <a14:hiddenLine xmlns="" xmlns:a14="http://schemas.microsoft.com/office/drawing/2010/main" w="9525">
                 <a:solidFill>
                   <a:srgbClr val="000000"/>
                 </a:solidFill>
@@ -3624,17 +3624,17 @@
           </a:ln>
           <a:extLst>
             <a:ext uri="{FAA26D3D-D897-4be2-8F04-BA451C77F1D7}">
-              <ma14:placeholderFlag xmlns="" xmlns:ma14="http://schemas.microsoft.com/office/mac/drawingml/2011/main" val="1"/>
+              <ma14:placeholderFlag xmlns:ma14="http://schemas.microsoft.com/office/mac/drawingml/2011/main" xmlns="" val="1"/>
             </a:ext>
             <a:ext uri="{909E8E84-426E-40dd-AFC4-6F175D3DCCD1}">
-              <a14:hiddenFill xmlns:a14="http://schemas.microsoft.com/office/drawing/2010/main" xmlns="">
+              <a14:hiddenFill xmlns="" xmlns:a14="http://schemas.microsoft.com/office/drawing/2010/main">
                 <a:solidFill>
                   <a:srgbClr val="FFFFFF"/>
                 </a:solidFill>
               </a14:hiddenFill>
             </a:ext>
             <a:ext uri="{91240B29-F687-4f45-9708-019B960494DF}">
-              <a14:hiddenLine xmlns:a14="http://schemas.microsoft.com/office/drawing/2010/main" xmlns="" w="9525">
+              <a14:hiddenLine xmlns="" xmlns:a14="http://schemas.microsoft.com/office/drawing/2010/main" w="9525">
                 <a:solidFill>
                   <a:srgbClr val="000000"/>
                 </a:solidFill>
@@ -5510,7 +5510,7 @@
         <p:spPr>
           <a:xfrm>
             <a:off x="533400" y="1905000"/>
-            <a:ext cx="7772400" cy="2286000"/>
+            <a:ext cx="7772400" cy="3581400"/>
           </a:xfrm>
         </p:spPr>
         <p:txBody>
@@ -5542,6 +5542,27 @@
               </a:rPr>
               <a:t>cmheazel@heazeltech.com</a:t>
             </a:r>
+            <a:endParaRPr lang="en-US" b="1" dirty="0"/>
+          </a:p>
+          <a:p>
+            <a:pPr algn="ctr"/>
+            <a:r>
+              <a:rPr lang="en-US" b="1" dirty="0"/>
+              <a:t>Peter Baumann</a:t>
+            </a:r>
+          </a:p>
+          <a:p>
+            <a:pPr algn="ctr"/>
+            <a:r>
+              <a:rPr lang="en-US" b="1" dirty="0">
+                <a:hlinkClick r:id="rId3"/>
+              </a:rPr>
+              <a:t>baumann@rsdaman.com</a:t>
+            </a:r>
+            <a:endParaRPr lang="en-US" b="1" dirty="0"/>
+          </a:p>
+          <a:p>
+            <a:pPr algn="ctr"/>
             <a:endParaRPr lang="en-US" b="1" dirty="0"/>
           </a:p>
           <a:p>

</xml_diff>